<commit_message>
Updated ppt and downloaded images
</commit_message>
<xml_diff>
--- a/midterm_presentation/SIMD_Addition.pptx
+++ b/midterm_presentation/SIMD_Addition.pptx
@@ -9,6 +9,9 @@
   </p:sldIdLst>
   <p:sldSz cx="12192000" cy="6858000"/>
   <p:notesSz cx="6858000" cy="9144000"/>
+  <p:custDataLst>
+    <p:tags r:id="rId3"/>
+  </p:custDataLst>
   <p:defaultTextStyle>
     <a:defPPr>
       <a:defRPr lang="en-US"/>
@@ -104,6 +107,11 @@
       </a:defRPr>
     </a:lvl9pPr>
   </p:defaultTextStyle>
+  <p:extLst>
+    <p:ext uri="{EFAFB233-063F-42B5-8137-9DF3F51BA10A}">
+      <p15:sldGuideLst xmlns:p15="http://schemas.microsoft.com/office/powerpoint/2012/main"/>
+    </p:ext>
+  </p:extLst>
 </p:presentation>
 </file>
 
@@ -254,7 +262,7 @@
           <a:p>
             <a:fld id="{E63B86FE-C560-4315-B91F-CCD84CBB5F1A}" type="datetimeFigureOut">
               <a:rPr lang="en-US" smtClean="0"/>
-              <a:t>11/10/2018</a:t>
+              <a:t>13-Nov-18</a:t>
             </a:fld>
             <a:endParaRPr lang="en-US"/>
           </a:p>
@@ -452,7 +460,7 @@
           <a:p>
             <a:fld id="{E63B86FE-C560-4315-B91F-CCD84CBB5F1A}" type="datetimeFigureOut">
               <a:rPr lang="en-US" smtClean="0"/>
-              <a:t>11/10/2018</a:t>
+              <a:t>13-Nov-18</a:t>
             </a:fld>
             <a:endParaRPr lang="en-US"/>
           </a:p>
@@ -660,7 +668,7 @@
           <a:p>
             <a:fld id="{E63B86FE-C560-4315-B91F-CCD84CBB5F1A}" type="datetimeFigureOut">
               <a:rPr lang="en-US" smtClean="0"/>
-              <a:t>11/10/2018</a:t>
+              <a:t>13-Nov-18</a:t>
             </a:fld>
             <a:endParaRPr lang="en-US"/>
           </a:p>
@@ -858,7 +866,7 @@
           <a:p>
             <a:fld id="{E63B86FE-C560-4315-B91F-CCD84CBB5F1A}" type="datetimeFigureOut">
               <a:rPr lang="en-US" smtClean="0"/>
-              <a:t>11/10/2018</a:t>
+              <a:t>13-Nov-18</a:t>
             </a:fld>
             <a:endParaRPr lang="en-US"/>
           </a:p>
@@ -1133,7 +1141,7 @@
           <a:p>
             <a:fld id="{E63B86FE-C560-4315-B91F-CCD84CBB5F1A}" type="datetimeFigureOut">
               <a:rPr lang="en-US" smtClean="0"/>
-              <a:t>11/10/2018</a:t>
+              <a:t>13-Nov-18</a:t>
             </a:fld>
             <a:endParaRPr lang="en-US"/>
           </a:p>
@@ -1398,7 +1406,7 @@
           <a:p>
             <a:fld id="{E63B86FE-C560-4315-B91F-CCD84CBB5F1A}" type="datetimeFigureOut">
               <a:rPr lang="en-US" smtClean="0"/>
-              <a:t>11/10/2018</a:t>
+              <a:t>13-Nov-18</a:t>
             </a:fld>
             <a:endParaRPr lang="en-US"/>
           </a:p>
@@ -1810,7 +1818,7 @@
           <a:p>
             <a:fld id="{E63B86FE-C560-4315-B91F-CCD84CBB5F1A}" type="datetimeFigureOut">
               <a:rPr lang="en-US" smtClean="0"/>
-              <a:t>11/10/2018</a:t>
+              <a:t>13-Nov-18</a:t>
             </a:fld>
             <a:endParaRPr lang="en-US"/>
           </a:p>
@@ -1951,7 +1959,7 @@
           <a:p>
             <a:fld id="{E63B86FE-C560-4315-B91F-CCD84CBB5F1A}" type="datetimeFigureOut">
               <a:rPr lang="en-US" smtClean="0"/>
-              <a:t>11/10/2018</a:t>
+              <a:t>13-Nov-18</a:t>
             </a:fld>
             <a:endParaRPr lang="en-US"/>
           </a:p>
@@ -2064,7 +2072,7 @@
           <a:p>
             <a:fld id="{E63B86FE-C560-4315-B91F-CCD84CBB5F1A}" type="datetimeFigureOut">
               <a:rPr lang="en-US" smtClean="0"/>
-              <a:t>11/10/2018</a:t>
+              <a:t>13-Nov-18</a:t>
             </a:fld>
             <a:endParaRPr lang="en-US"/>
           </a:p>
@@ -2375,7 +2383,7 @@
           <a:p>
             <a:fld id="{E63B86FE-C560-4315-B91F-CCD84CBB5F1A}" type="datetimeFigureOut">
               <a:rPr lang="en-US" smtClean="0"/>
-              <a:t>11/10/2018</a:t>
+              <a:t>13-Nov-18</a:t>
             </a:fld>
             <a:endParaRPr lang="en-US"/>
           </a:p>
@@ -2663,7 +2671,7 @@
           <a:p>
             <a:fld id="{E63B86FE-C560-4315-B91F-CCD84CBB5F1A}" type="datetimeFigureOut">
               <a:rPr lang="en-US" smtClean="0"/>
-              <a:t>11/10/2018</a:t>
+              <a:t>13-Nov-18</a:t>
             </a:fld>
             <a:endParaRPr lang="en-US"/>
           </a:p>
@@ -2904,7 +2912,7 @@
           <a:p>
             <a:fld id="{E63B86FE-C560-4315-B91F-CCD84CBB5F1A}" type="datetimeFigureOut">
               <a:rPr lang="en-US" smtClean="0"/>
-              <a:t>11/10/2018</a:t>
+              <a:t>13-Nov-18</a:t>
             </a:fld>
             <a:endParaRPr lang="en-US"/>
           </a:p>
@@ -6057,8 +6065,8 @@
           </a:graphicData>
         </a:graphic>
       </p:graphicFrame>
-      <mc:AlternateContent xmlns:mc="http://schemas.openxmlformats.org/markup-compatibility/2006">
-        <mc:Choice xmlns:a14="http://schemas.microsoft.com/office/drawing/2010/main" Requires="a14">
+      <mc:AlternateContent xmlns:mc="http://schemas.openxmlformats.org/markup-compatibility/2006" xmlns:a14="http://schemas.microsoft.com/office/drawing/2010/main">
+        <mc:Choice Requires="a14">
           <p:sp>
             <p:nvSpPr>
               <p:cNvPr id="17" name="TextBox 16">
@@ -6140,7 +6148,7 @@
             </p:txBody>
           </p:sp>
         </mc:Choice>
-        <mc:Fallback>
+        <mc:Fallback xmlns="">
           <p:sp>
             <p:nvSpPr>
               <p:cNvPr id="17" name="TextBox 16">
@@ -6164,7 +6172,7 @@
                 <a:avLst/>
               </a:prstGeom>
               <a:blipFill>
-                <a:blip r:embed="rId2"/>
+                <a:blip r:embed="rId3"/>
                 <a:stretch>
                   <a:fillRect b="-11628"/>
                 </a:stretch>
@@ -6317,8 +6325,8 @@
           </a:p>
         </p:txBody>
       </p:sp>
-      <mc:AlternateContent xmlns:mc="http://schemas.openxmlformats.org/markup-compatibility/2006">
-        <mc:Choice xmlns:a14="http://schemas.microsoft.com/office/drawing/2010/main" Requires="a14">
+      <mc:AlternateContent xmlns:mc="http://schemas.openxmlformats.org/markup-compatibility/2006" xmlns:a14="http://schemas.microsoft.com/office/drawing/2010/main">
+        <mc:Choice Requires="a14">
           <p:graphicFrame>
             <p:nvGraphicFramePr>
               <p:cNvPr id="22" name="Table 21">
@@ -6845,7 +6853,7 @@
             </a:graphic>
           </p:graphicFrame>
         </mc:Choice>
-        <mc:Fallback>
+        <mc:Fallback xmlns="">
           <p:graphicFrame>
             <p:nvGraphicFramePr>
               <p:cNvPr id="22" name="Table 21">
@@ -6975,7 +6983,7 @@
                           <a:prstDash val="solid"/>
                         </a:lnBlToTr>
                         <a:blipFill>
-                          <a:blip r:embed="rId3"/>
+                          <a:blip r:embed="rId4"/>
                           <a:stretch>
                             <a:fillRect l="-1190" t="-1613" r="-498810" b="-3226"/>
                           </a:stretch>
@@ -7028,7 +7036,7 @@
                           <a:tailEnd type="none" w="med" len="med"/>
                         </a:lnB>
                         <a:blipFill>
-                          <a:blip r:embed="rId3"/>
+                          <a:blip r:embed="rId4"/>
                           <a:stretch>
                             <a:fillRect l="-102410" t="-1613" r="-404819" b="-3226"/>
                           </a:stretch>
@@ -7185,7 +7193,7 @@
                           <a:tailEnd type="none" w="med" len="med"/>
                         </a:lnB>
                         <a:blipFill>
-                          <a:blip r:embed="rId3"/>
+                          <a:blip r:embed="rId4"/>
                           <a:stretch>
                             <a:fillRect l="-398810" t="-1613" r="-101190" b="-3226"/>
                           </a:stretch>
@@ -7238,7 +7246,7 @@
                           <a:tailEnd type="none" w="med" len="med"/>
                         </a:lnB>
                         <a:blipFill>
-                          <a:blip r:embed="rId3"/>
+                          <a:blip r:embed="rId4"/>
                           <a:stretch>
                             <a:fillRect l="-504819" t="-1613" r="-2410" b="-3226"/>
                           </a:stretch>
@@ -7294,8 +7302,8 @@
           </a:p>
         </p:txBody>
       </p:sp>
-      <mc:AlternateContent xmlns:mc="http://schemas.openxmlformats.org/markup-compatibility/2006">
-        <mc:Choice xmlns:a14="http://schemas.microsoft.com/office/drawing/2010/main" Requires="a14">
+      <mc:AlternateContent xmlns:mc="http://schemas.openxmlformats.org/markup-compatibility/2006" xmlns:a14="http://schemas.microsoft.com/office/drawing/2010/main">
+        <mc:Choice Requires="a14">
           <p:sp>
             <p:nvSpPr>
               <p:cNvPr id="24" name="TextBox 23">
@@ -7397,7 +7405,7 @@
             </p:txBody>
           </p:sp>
         </mc:Choice>
-        <mc:Fallback>
+        <mc:Fallback xmlns="">
           <p:sp>
             <p:nvSpPr>
               <p:cNvPr id="24" name="TextBox 23">
@@ -7421,7 +7429,7 @@
                 <a:avLst/>
               </a:prstGeom>
               <a:blipFill>
-                <a:blip r:embed="rId4"/>
+                <a:blip r:embed="rId5"/>
                 <a:stretch>
                   <a:fillRect t="-111111" b="-179365"/>
                 </a:stretch>
@@ -7479,7 +7487,44 @@
           </a:p>
         </p:txBody>
       </p:sp>
+      <p:sp>
+        <p:nvSpPr>
+          <p:cNvPr id="12" name="RS_Classification_Standard"/>
+          <p:cNvSpPr txBox="1"/>
+          <p:nvPr/>
+        </p:nvSpPr>
+        <p:spPr>
+          <a:xfrm>
+            <a:off x="12038047" y="6289521"/>
+            <a:ext cx="153953" cy="212879"/>
+          </a:xfrm>
+          <a:prstGeom prst="rect">
+            <a:avLst/>
+          </a:prstGeom>
+          <a:solidFill>
+            <a:srgbClr val="FFFFFF">
+              <a:alpha val="0"/>
+            </a:srgbClr>
+          </a:solidFill>
+        </p:spPr>
+        <p:txBody>
+          <a:bodyPr vert="horz" wrap="none" lIns="76200" tIns="36830" rIns="76200" bIns="36830" rtlCol="0" anchor="ctr">
+            <a:spAutoFit/>
+          </a:bodyPr>
+          <a:lstStyle/>
+          <a:p>
+            <a:endParaRPr lang="en-US" sz="900" b="1" kern="900" spc="100">
+              <a:solidFill>
+                <a:srgbClr val="000000"/>
+              </a:solidFill>
+            </a:endParaRPr>
+          </a:p>
+        </p:txBody>
+      </p:sp>
     </p:spTree>
+    <p:custDataLst>
+      <p:tags r:id="rId1"/>
+    </p:custDataLst>
     <p:extLst>
       <p:ext uri="{BB962C8B-B14F-4D97-AF65-F5344CB8AC3E}">
         <p14:creationId xmlns:p14="http://schemas.microsoft.com/office/powerpoint/2010/main" val="1769314623"/>
@@ -7490,6 +7535,19 @@
     <a:masterClrMapping/>
   </p:clrMapOvr>
 </p:sld>
+</file>
+
+<file path=ppt/tags/tag1.xml><?xml version="1.0" encoding="utf-8"?>
+<p:tagLst xmlns:a="http://schemas.openxmlformats.org/drawingml/2006/main" xmlns:r="http://schemas.openxmlformats.org/officeDocument/2006/relationships" xmlns:p="http://schemas.openxmlformats.org/presentationml/2006/main">
+  <p:tag name="RS_CLASSIFICATION_RESETFORMATTING" val="True"/>
+</p:tagLst>
+</file>
+
+<file path=ppt/tags/tag2.xml><?xml version="1.0" encoding="utf-8"?>
+<p:tagLst xmlns:a="http://schemas.openxmlformats.org/drawingml/2006/main" xmlns:r="http://schemas.openxmlformats.org/officeDocument/2006/relationships" xmlns:p="http://schemas.openxmlformats.org/presentationml/2006/main">
+  <p:tag name="RS_CLASSIFICATIONID" val="0"/>
+  <p:tag name="RS_CLASSIFICATION" val="UNRESTRICTED"/>
+</p:tagLst>
 </file>
 
 <file path=ppt/theme/theme1.xml><?xml version="1.0" encoding="utf-8"?>

</xml_diff>